<commit_message>
Finished cal source line ID and experimented with phase correction and qualityCheckLinefit
</commit_message>
<xml_diff>
--- a/LineID_20240723.pptx
+++ b/LineID_20240723.pptx
@@ -105,6 +105,11 @@
       </a:defRPr>
     </a:lvl9pPr>
   </p:defaultTextStyle>
+  <p:extLst>
+    <p:ext uri="{EFAFB233-063F-42B5-8137-9DF3F51BA10A}">
+      <p15:sldGuideLst xmlns:p15="http://schemas.microsoft.com/office/powerpoint/2012/main"/>
+    </p:ext>
+  </p:extLst>
 </p:presentation>
 </file>
 
@@ -255,7 +260,7 @@
           <a:p>
             <a:fld id="{3639DF4F-A26E-4AB0-BE94-D0DCDD25FC09}" type="datetimeFigureOut">
               <a:rPr lang="en-US" smtClean="0"/>
-              <a:t>2/5/2025</a:t>
+              <a:t>2/6/2025</a:t>
             </a:fld>
             <a:endParaRPr lang="en-US"/>
           </a:p>
@@ -453,7 +458,7 @@
           <a:p>
             <a:fld id="{3639DF4F-A26E-4AB0-BE94-D0DCDD25FC09}" type="datetimeFigureOut">
               <a:rPr lang="en-US" smtClean="0"/>
-              <a:t>2/5/2025</a:t>
+              <a:t>2/6/2025</a:t>
             </a:fld>
             <a:endParaRPr lang="en-US"/>
           </a:p>
@@ -661,7 +666,7 @@
           <a:p>
             <a:fld id="{3639DF4F-A26E-4AB0-BE94-D0DCDD25FC09}" type="datetimeFigureOut">
               <a:rPr lang="en-US" smtClean="0"/>
-              <a:t>2/5/2025</a:t>
+              <a:t>2/6/2025</a:t>
             </a:fld>
             <a:endParaRPr lang="en-US"/>
           </a:p>
@@ -859,7 +864,7 @@
           <a:p>
             <a:fld id="{3639DF4F-A26E-4AB0-BE94-D0DCDD25FC09}" type="datetimeFigureOut">
               <a:rPr lang="en-US" smtClean="0"/>
-              <a:t>2/5/2025</a:t>
+              <a:t>2/6/2025</a:t>
             </a:fld>
             <a:endParaRPr lang="en-US"/>
           </a:p>
@@ -1134,7 +1139,7 @@
           <a:p>
             <a:fld id="{3639DF4F-A26E-4AB0-BE94-D0DCDD25FC09}" type="datetimeFigureOut">
               <a:rPr lang="en-US" smtClean="0"/>
-              <a:t>2/5/2025</a:t>
+              <a:t>2/6/2025</a:t>
             </a:fld>
             <a:endParaRPr lang="en-US"/>
           </a:p>
@@ -1399,7 +1404,7 @@
           <a:p>
             <a:fld id="{3639DF4F-A26E-4AB0-BE94-D0DCDD25FC09}" type="datetimeFigureOut">
               <a:rPr lang="en-US" smtClean="0"/>
-              <a:t>2/5/2025</a:t>
+              <a:t>2/6/2025</a:t>
             </a:fld>
             <a:endParaRPr lang="en-US"/>
           </a:p>
@@ -1811,7 +1816,7 @@
           <a:p>
             <a:fld id="{3639DF4F-A26E-4AB0-BE94-D0DCDD25FC09}" type="datetimeFigureOut">
               <a:rPr lang="en-US" smtClean="0"/>
-              <a:t>2/5/2025</a:t>
+              <a:t>2/6/2025</a:t>
             </a:fld>
             <a:endParaRPr lang="en-US"/>
           </a:p>
@@ -1952,7 +1957,7 @@
           <a:p>
             <a:fld id="{3639DF4F-A26E-4AB0-BE94-D0DCDD25FC09}" type="datetimeFigureOut">
               <a:rPr lang="en-US" smtClean="0"/>
-              <a:t>2/5/2025</a:t>
+              <a:t>2/6/2025</a:t>
             </a:fld>
             <a:endParaRPr lang="en-US"/>
           </a:p>
@@ -2065,7 +2070,7 @@
           <a:p>
             <a:fld id="{3639DF4F-A26E-4AB0-BE94-D0DCDD25FC09}" type="datetimeFigureOut">
               <a:rPr lang="en-US" smtClean="0"/>
-              <a:t>2/5/2025</a:t>
+              <a:t>2/6/2025</a:t>
             </a:fld>
             <a:endParaRPr lang="en-US"/>
           </a:p>
@@ -2376,7 +2381,7 @@
           <a:p>
             <a:fld id="{3639DF4F-A26E-4AB0-BE94-D0DCDD25FC09}" type="datetimeFigureOut">
               <a:rPr lang="en-US" smtClean="0"/>
-              <a:t>2/5/2025</a:t>
+              <a:t>2/6/2025</a:t>
             </a:fld>
             <a:endParaRPr lang="en-US"/>
           </a:p>
@@ -2664,7 +2669,7 @@
           <a:p>
             <a:fld id="{3639DF4F-A26E-4AB0-BE94-D0DCDD25FC09}" type="datetimeFigureOut">
               <a:rPr lang="en-US" smtClean="0"/>
-              <a:t>2/5/2025</a:t>
+              <a:t>2/6/2025</a:t>
             </a:fld>
             <a:endParaRPr lang="en-US"/>
           </a:p>
@@ -2905,7 +2910,7 @@
           <a:p>
             <a:fld id="{3639DF4F-A26E-4AB0-BE94-D0DCDD25FC09}" type="datetimeFigureOut">
               <a:rPr lang="en-US" smtClean="0"/>
-              <a:t>2/5/2025</a:t>
+              <a:t>2/6/2025</a:t>
             </a:fld>
             <a:endParaRPr lang="en-US"/>
           </a:p>
@@ -3417,12 +3422,47 @@
           <a:chExt cx="0" cy="0"/>
         </a:xfrm>
       </p:grpSpPr>
+      <p:sp>
+        <p:nvSpPr>
+          <p:cNvPr id="7" name="TextBox 6">
+            <a:extLst>
+              <a:ext uri="{FF2B5EF4-FFF2-40B4-BE49-F238E27FC236}">
+                <a16:creationId xmlns:a16="http://schemas.microsoft.com/office/drawing/2014/main" id="{B08A9B8E-5FD8-D0CA-28AF-5BE4E7C20F09}"/>
+              </a:ext>
+            </a:extLst>
+          </p:cNvPr>
+          <p:cNvSpPr txBox="1"/>
+          <p:nvPr/>
+        </p:nvSpPr>
+        <p:spPr>
+          <a:xfrm>
+            <a:off x="7237740" y="298232"/>
+            <a:ext cx="4483996" cy="1754326"/>
+          </a:xfrm>
+          <a:prstGeom prst="rect">
+            <a:avLst/>
+          </a:prstGeom>
+          <a:noFill/>
+        </p:spPr>
+        <p:txBody>
+          <a:bodyPr wrap="square">
+            <a:spAutoFit/>
+          </a:bodyPr>
+          <a:lstStyle/>
+          <a:p>
+            <a:r>
+              <a:rPr lang="en-US" dirty="0"/>
+              <a:t>https://physics.nist.gov/cgi-bin/XrayTrans/search.pl?element=Sc&amp;element=V&amp;element=Mn&amp;element=Fe&amp;element=Cu&amp;element=Al&amp;element=Zn&amp;element=Co&amp;element=Ge&amp;trans=KL2&amp;trans=KL3&amp;trans=KM3&amp;lower=&amp;upper=&amp;units=eV</a:t>
+            </a:r>
+          </a:p>
+        </p:txBody>
+      </p:sp>
       <p:pic>
         <p:nvPicPr>
-          <p:cNvPr id="5" name="Picture 4">
-            <a:extLst>
-              <a:ext uri="{FF2B5EF4-FFF2-40B4-BE49-F238E27FC236}">
-                <a16:creationId xmlns:a16="http://schemas.microsoft.com/office/drawing/2014/main" id="{297C0BF8-55A4-4547-F4D4-8723C93A7115}"/>
+          <p:cNvPr id="6" name="Picture 5">
+            <a:extLst>
+              <a:ext uri="{FF2B5EF4-FFF2-40B4-BE49-F238E27FC236}">
+                <a16:creationId xmlns:a16="http://schemas.microsoft.com/office/drawing/2014/main" id="{255CE9C4-8055-2838-2918-EE686E6E0111}"/>
               </a:ext>
             </a:extLst>
           </p:cNvPr>
@@ -3439,49 +3479,14 @@
         </p:blipFill>
         <p:spPr>
           <a:xfrm>
-            <a:off x="312827" y="147637"/>
-            <a:ext cx="6010275" cy="6562725"/>
+            <a:off x="0" y="104502"/>
+            <a:ext cx="4819650" cy="6505575"/>
           </a:xfrm>
           <a:prstGeom prst="rect">
             <a:avLst/>
           </a:prstGeom>
         </p:spPr>
       </p:pic>
-      <p:sp>
-        <p:nvSpPr>
-          <p:cNvPr id="7" name="TextBox 6">
-            <a:extLst>
-              <a:ext uri="{FF2B5EF4-FFF2-40B4-BE49-F238E27FC236}">
-                <a16:creationId xmlns:a16="http://schemas.microsoft.com/office/drawing/2014/main" id="{B08A9B8E-5FD8-D0CA-28AF-5BE4E7C20F09}"/>
-              </a:ext>
-            </a:extLst>
-          </p:cNvPr>
-          <p:cNvSpPr txBox="1"/>
-          <p:nvPr/>
-        </p:nvSpPr>
-        <p:spPr>
-          <a:xfrm>
-            <a:off x="6009832" y="1534850"/>
-            <a:ext cx="6097836" cy="1477328"/>
-          </a:xfrm>
-          <a:prstGeom prst="rect">
-            <a:avLst/>
-          </a:prstGeom>
-          <a:noFill/>
-        </p:spPr>
-        <p:txBody>
-          <a:bodyPr wrap="square">
-            <a:spAutoFit/>
-          </a:bodyPr>
-          <a:lstStyle/>
-          <a:p>
-            <a:r>
-              <a:rPr lang="en-US" dirty="0"/>
-              <a:t>https://physics.nist.gov/cgi-bin/XrayTrans/search.pl?element=Sc&amp;element=V&amp;element=Mn&amp;element=Fe&amp;element=Cu&amp;element=Zn&amp;element=Ge&amp;trans=KL2&amp;trans=KL3&amp;trans=KM3&amp;lower=&amp;upper=&amp;units=eV</a:t>
-            </a:r>
-          </a:p>
-        </p:txBody>
-      </p:sp>
     </p:spTree>
     <p:extLst>
       <p:ext uri="{BB962C8B-B14F-4D97-AF65-F5344CB8AC3E}">

</xml_diff>

<commit_message>
Added scripts for other runs
</commit_message>
<xml_diff>
--- a/LineID_20240723.pptx
+++ b/LineID_20240723.pptx
@@ -7,6 +7,10 @@
   <p:sldIdLst>
     <p:sldId id="256" r:id="rId2"/>
     <p:sldId id="257" r:id="rId3"/>
+    <p:sldId id="259" r:id="rId4"/>
+    <p:sldId id="258" r:id="rId5"/>
+    <p:sldId id="260" r:id="rId6"/>
+    <p:sldId id="261" r:id="rId7"/>
   </p:sldIdLst>
   <p:sldSz cx="12192000" cy="6858000"/>
   <p:notesSz cx="6858000" cy="9144000"/>
@@ -260,7 +264,7 @@
           <a:p>
             <a:fld id="{3639DF4F-A26E-4AB0-BE94-D0DCDD25FC09}" type="datetimeFigureOut">
               <a:rPr lang="en-US" smtClean="0"/>
-              <a:t>2/6/2025</a:t>
+              <a:t>2/11/2025</a:t>
             </a:fld>
             <a:endParaRPr lang="en-US"/>
           </a:p>
@@ -458,7 +462,7 @@
           <a:p>
             <a:fld id="{3639DF4F-A26E-4AB0-BE94-D0DCDD25FC09}" type="datetimeFigureOut">
               <a:rPr lang="en-US" smtClean="0"/>
-              <a:t>2/6/2025</a:t>
+              <a:t>2/11/2025</a:t>
             </a:fld>
             <a:endParaRPr lang="en-US"/>
           </a:p>
@@ -666,7 +670,7 @@
           <a:p>
             <a:fld id="{3639DF4F-A26E-4AB0-BE94-D0DCDD25FC09}" type="datetimeFigureOut">
               <a:rPr lang="en-US" smtClean="0"/>
-              <a:t>2/6/2025</a:t>
+              <a:t>2/11/2025</a:t>
             </a:fld>
             <a:endParaRPr lang="en-US"/>
           </a:p>
@@ -864,7 +868,7 @@
           <a:p>
             <a:fld id="{3639DF4F-A26E-4AB0-BE94-D0DCDD25FC09}" type="datetimeFigureOut">
               <a:rPr lang="en-US" smtClean="0"/>
-              <a:t>2/6/2025</a:t>
+              <a:t>2/11/2025</a:t>
             </a:fld>
             <a:endParaRPr lang="en-US"/>
           </a:p>
@@ -1139,7 +1143,7 @@
           <a:p>
             <a:fld id="{3639DF4F-A26E-4AB0-BE94-D0DCDD25FC09}" type="datetimeFigureOut">
               <a:rPr lang="en-US" smtClean="0"/>
-              <a:t>2/6/2025</a:t>
+              <a:t>2/11/2025</a:t>
             </a:fld>
             <a:endParaRPr lang="en-US"/>
           </a:p>
@@ -1404,7 +1408,7 @@
           <a:p>
             <a:fld id="{3639DF4F-A26E-4AB0-BE94-D0DCDD25FC09}" type="datetimeFigureOut">
               <a:rPr lang="en-US" smtClean="0"/>
-              <a:t>2/6/2025</a:t>
+              <a:t>2/11/2025</a:t>
             </a:fld>
             <a:endParaRPr lang="en-US"/>
           </a:p>
@@ -1816,7 +1820,7 @@
           <a:p>
             <a:fld id="{3639DF4F-A26E-4AB0-BE94-D0DCDD25FC09}" type="datetimeFigureOut">
               <a:rPr lang="en-US" smtClean="0"/>
-              <a:t>2/6/2025</a:t>
+              <a:t>2/11/2025</a:t>
             </a:fld>
             <a:endParaRPr lang="en-US"/>
           </a:p>
@@ -1957,7 +1961,7 @@
           <a:p>
             <a:fld id="{3639DF4F-A26E-4AB0-BE94-D0DCDD25FC09}" type="datetimeFigureOut">
               <a:rPr lang="en-US" smtClean="0"/>
-              <a:t>2/6/2025</a:t>
+              <a:t>2/11/2025</a:t>
             </a:fld>
             <a:endParaRPr lang="en-US"/>
           </a:p>
@@ -2070,7 +2074,7 @@
           <a:p>
             <a:fld id="{3639DF4F-A26E-4AB0-BE94-D0DCDD25FC09}" type="datetimeFigureOut">
               <a:rPr lang="en-US" smtClean="0"/>
-              <a:t>2/6/2025</a:t>
+              <a:t>2/11/2025</a:t>
             </a:fld>
             <a:endParaRPr lang="en-US"/>
           </a:p>
@@ -2381,7 +2385,7 @@
           <a:p>
             <a:fld id="{3639DF4F-A26E-4AB0-BE94-D0DCDD25FC09}" type="datetimeFigureOut">
               <a:rPr lang="en-US" smtClean="0"/>
-              <a:t>2/6/2025</a:t>
+              <a:t>2/11/2025</a:t>
             </a:fld>
             <a:endParaRPr lang="en-US"/>
           </a:p>
@@ -2669,7 +2673,7 @@
           <a:p>
             <a:fld id="{3639DF4F-A26E-4AB0-BE94-D0DCDD25FC09}" type="datetimeFigureOut">
               <a:rPr lang="en-US" smtClean="0"/>
-              <a:t>2/6/2025</a:t>
+              <a:t>2/11/2025</a:t>
             </a:fld>
             <a:endParaRPr lang="en-US"/>
           </a:p>
@@ -2910,7 +2914,7 @@
           <a:p>
             <a:fld id="{3639DF4F-A26E-4AB0-BE94-D0DCDD25FC09}" type="datetimeFigureOut">
               <a:rPr lang="en-US" smtClean="0"/>
-              <a:t>2/6/2025</a:t>
+              <a:t>2/11/2025</a:t>
             </a:fld>
             <a:endParaRPr lang="en-US"/>
           </a:p>
@@ -3500,6 +3504,389 @@
 </p:sld>
 </file>
 
+<file path=ppt/slides/slide3.xml><?xml version="1.0" encoding="utf-8"?>
+<p:sld xmlns:a="http://schemas.openxmlformats.org/drawingml/2006/main" xmlns:r="http://schemas.openxmlformats.org/officeDocument/2006/relationships" xmlns:p="http://schemas.openxmlformats.org/presentationml/2006/main">
+  <p:cSld>
+    <p:spTree>
+      <p:nvGrpSpPr>
+        <p:cNvPr id="1" name=""/>
+        <p:cNvGrpSpPr/>
+        <p:nvPr/>
+      </p:nvGrpSpPr>
+      <p:grpSpPr>
+        <a:xfrm>
+          <a:off x="0" y="0"/>
+          <a:ext cx="0" cy="0"/>
+          <a:chOff x="0" y="0"/>
+          <a:chExt cx="0" cy="0"/>
+        </a:xfrm>
+      </p:grpSpPr>
+      <p:pic>
+        <p:nvPicPr>
+          <p:cNvPr id="5" name="Picture 4">
+            <a:extLst>
+              <a:ext uri="{FF2B5EF4-FFF2-40B4-BE49-F238E27FC236}">
+                <a16:creationId xmlns:a16="http://schemas.microsoft.com/office/drawing/2014/main" id="{EB4ECBEC-2AD1-14FE-1C4C-2E24C9A72A70}"/>
+              </a:ext>
+            </a:extLst>
+          </p:cNvPr>
+          <p:cNvPicPr>
+            <a:picLocks noChangeAspect="1"/>
+          </p:cNvPicPr>
+          <p:nvPr/>
+        </p:nvPicPr>
+        <p:blipFill>
+          <a:blip r:embed="rId2"/>
+          <a:stretch>
+            <a:fillRect/>
+          </a:stretch>
+        </p:blipFill>
+        <p:spPr>
+          <a:xfrm>
+            <a:off x="0" y="1189854"/>
+            <a:ext cx="12192000" cy="4478291"/>
+          </a:xfrm>
+          <a:prstGeom prst="rect">
+            <a:avLst/>
+          </a:prstGeom>
+        </p:spPr>
+      </p:pic>
+    </p:spTree>
+    <p:extLst>
+      <p:ext uri="{BB962C8B-B14F-4D97-AF65-F5344CB8AC3E}">
+        <p14:creationId xmlns:p14="http://schemas.microsoft.com/office/powerpoint/2010/main" val="3782311905"/>
+      </p:ext>
+    </p:extLst>
+  </p:cSld>
+  <p:clrMapOvr>
+    <a:masterClrMapping/>
+  </p:clrMapOvr>
+</p:sld>
+</file>
+
+<file path=ppt/slides/slide4.xml><?xml version="1.0" encoding="utf-8"?>
+<p:sld xmlns:a="http://schemas.openxmlformats.org/drawingml/2006/main" xmlns:r="http://schemas.openxmlformats.org/officeDocument/2006/relationships" xmlns:p="http://schemas.openxmlformats.org/presentationml/2006/main">
+  <p:cSld>
+    <p:spTree>
+      <p:nvGrpSpPr>
+        <p:cNvPr id="1" name=""/>
+        <p:cNvGrpSpPr/>
+        <p:nvPr/>
+      </p:nvGrpSpPr>
+      <p:grpSpPr>
+        <a:xfrm>
+          <a:off x="0" y="0"/>
+          <a:ext cx="0" cy="0"/>
+          <a:chOff x="0" y="0"/>
+          <a:chExt cx="0" cy="0"/>
+        </a:xfrm>
+      </p:grpSpPr>
+      <p:pic>
+        <p:nvPicPr>
+          <p:cNvPr id="4" name="Picture 3">
+            <a:extLst>
+              <a:ext uri="{FF2B5EF4-FFF2-40B4-BE49-F238E27FC236}">
+                <a16:creationId xmlns:a16="http://schemas.microsoft.com/office/drawing/2014/main" id="{79E74CBA-2FA0-D114-4B11-78B41AA76411}"/>
+              </a:ext>
+            </a:extLst>
+          </p:cNvPr>
+          <p:cNvPicPr>
+            <a:picLocks noChangeAspect="1"/>
+          </p:cNvPicPr>
+          <p:nvPr/>
+        </p:nvPicPr>
+        <p:blipFill>
+          <a:blip r:embed="rId2"/>
+          <a:stretch>
+            <a:fillRect/>
+          </a:stretch>
+        </p:blipFill>
+        <p:spPr>
+          <a:xfrm>
+            <a:off x="0" y="612128"/>
+            <a:ext cx="12192000" cy="5633744"/>
+          </a:xfrm>
+          <a:prstGeom prst="rect">
+            <a:avLst/>
+          </a:prstGeom>
+        </p:spPr>
+      </p:pic>
+    </p:spTree>
+    <p:extLst>
+      <p:ext uri="{BB962C8B-B14F-4D97-AF65-F5344CB8AC3E}">
+        <p14:creationId xmlns:p14="http://schemas.microsoft.com/office/powerpoint/2010/main" val="1326744236"/>
+      </p:ext>
+    </p:extLst>
+  </p:cSld>
+  <p:clrMapOvr>
+    <a:masterClrMapping/>
+  </p:clrMapOvr>
+</p:sld>
+</file>
+
+<file path=ppt/slides/slide5.xml><?xml version="1.0" encoding="utf-8"?>
+<p:sld xmlns:a="http://schemas.openxmlformats.org/drawingml/2006/main" xmlns:r="http://schemas.openxmlformats.org/officeDocument/2006/relationships" xmlns:p="http://schemas.openxmlformats.org/presentationml/2006/main">
+  <p:cSld>
+    <p:spTree>
+      <p:nvGrpSpPr>
+        <p:cNvPr id="1" name=""/>
+        <p:cNvGrpSpPr/>
+        <p:nvPr/>
+      </p:nvGrpSpPr>
+      <p:grpSpPr>
+        <a:xfrm>
+          <a:off x="0" y="0"/>
+          <a:ext cx="0" cy="0"/>
+          <a:chOff x="0" y="0"/>
+          <a:chExt cx="0" cy="0"/>
+        </a:xfrm>
+      </p:grpSpPr>
+      <p:sp>
+        <p:nvSpPr>
+          <p:cNvPr id="2" name="Title 1">
+            <a:extLst>
+              <a:ext uri="{FF2B5EF4-FFF2-40B4-BE49-F238E27FC236}">
+                <a16:creationId xmlns:a16="http://schemas.microsoft.com/office/drawing/2014/main" id="{9EA0F06A-BAEE-4B12-D247-2F35783B0B29}"/>
+              </a:ext>
+            </a:extLst>
+          </p:cNvPr>
+          <p:cNvSpPr>
+            <a:spLocks noGrp="1"/>
+          </p:cNvSpPr>
+          <p:nvPr>
+            <p:ph type="title"/>
+          </p:nvPr>
+        </p:nvSpPr>
+        <p:spPr/>
+        <p:txBody>
+          <a:bodyPr/>
+          <a:lstStyle/>
+          <a:p>
+            <a:r>
+              <a:rPr lang="en-US" dirty="0"/>
+              <a:t>Notes	</a:t>
+            </a:r>
+          </a:p>
+        </p:txBody>
+      </p:sp>
+      <p:sp>
+        <p:nvSpPr>
+          <p:cNvPr id="3" name="Content Placeholder 2">
+            <a:extLst>
+              <a:ext uri="{FF2B5EF4-FFF2-40B4-BE49-F238E27FC236}">
+                <a16:creationId xmlns:a16="http://schemas.microsoft.com/office/drawing/2014/main" id="{EE6B1196-4176-1A95-467E-95B5BBC3A11C}"/>
+              </a:ext>
+            </a:extLst>
+          </p:cNvPr>
+          <p:cNvSpPr>
+            <a:spLocks noGrp="1"/>
+          </p:cNvSpPr>
+          <p:nvPr>
+            <p:ph idx="1"/>
+          </p:nvPr>
+        </p:nvSpPr>
+        <p:spPr/>
+        <p:txBody>
+          <a:bodyPr/>
+          <a:lstStyle/>
+          <a:p>
+            <a:r>
+              <a:rPr lang="en-US" dirty="0"/>
+              <a:t>Seems to be two unidentified features near 10200 and 10500 eV. </a:t>
+            </a:r>
+            <a:r>
+              <a:rPr lang="en-US" b="1" dirty="0"/>
+              <a:t>There is a lot of variance between channels</a:t>
+            </a:r>
+            <a:r>
+              <a:rPr lang="en-US" dirty="0"/>
+              <a:t>, even when the calibration includes lines on either side within 1 keV. There are some Li-like Ge lines that agree with these energies, but I’m not sure how that would be produced.</a:t>
+            </a:r>
+          </a:p>
+        </p:txBody>
+      </p:sp>
+    </p:spTree>
+    <p:extLst>
+      <p:ext uri="{BB962C8B-B14F-4D97-AF65-F5344CB8AC3E}">
+        <p14:creationId xmlns:p14="http://schemas.microsoft.com/office/powerpoint/2010/main" val="2820057416"/>
+      </p:ext>
+    </p:extLst>
+  </p:cSld>
+  <p:clrMapOvr>
+    <a:masterClrMapping/>
+  </p:clrMapOvr>
+</p:sld>
+</file>
+
+<file path=ppt/slides/slide6.xml><?xml version="1.0" encoding="utf-8"?>
+<p:sld xmlns:a="http://schemas.openxmlformats.org/drawingml/2006/main" xmlns:r="http://schemas.openxmlformats.org/officeDocument/2006/relationships" xmlns:p="http://schemas.openxmlformats.org/presentationml/2006/main">
+  <p:cSld>
+    <p:spTree>
+      <p:nvGrpSpPr>
+        <p:cNvPr id="1" name=""/>
+        <p:cNvGrpSpPr/>
+        <p:nvPr/>
+      </p:nvGrpSpPr>
+      <p:grpSpPr>
+        <a:xfrm>
+          <a:off x="0" y="0"/>
+          <a:ext cx="0" cy="0"/>
+          <a:chOff x="0" y="0"/>
+          <a:chExt cx="0" cy="0"/>
+        </a:xfrm>
+      </p:grpSpPr>
+      <p:pic>
+        <p:nvPicPr>
+          <p:cNvPr id="5" name="Picture 4">
+            <a:extLst>
+              <a:ext uri="{FF2B5EF4-FFF2-40B4-BE49-F238E27FC236}">
+                <a16:creationId xmlns:a16="http://schemas.microsoft.com/office/drawing/2014/main" id="{EF88D362-1B2B-74DD-8E69-FA347BF3CD14}"/>
+              </a:ext>
+            </a:extLst>
+          </p:cNvPr>
+          <p:cNvPicPr>
+            <a:picLocks noChangeAspect="1"/>
+          </p:cNvPicPr>
+          <p:nvPr/>
+        </p:nvPicPr>
+        <p:blipFill>
+          <a:blip r:embed="rId2"/>
+          <a:stretch>
+            <a:fillRect/>
+          </a:stretch>
+        </p:blipFill>
+        <p:spPr>
+          <a:xfrm>
+            <a:off x="0" y="986678"/>
+            <a:ext cx="12192000" cy="4884643"/>
+          </a:xfrm>
+          <a:prstGeom prst="rect">
+            <a:avLst/>
+          </a:prstGeom>
+        </p:spPr>
+      </p:pic>
+      <p:sp>
+        <p:nvSpPr>
+          <p:cNvPr id="2" name="TextBox 1">
+            <a:extLst>
+              <a:ext uri="{FF2B5EF4-FFF2-40B4-BE49-F238E27FC236}">
+                <a16:creationId xmlns:a16="http://schemas.microsoft.com/office/drawing/2014/main" id="{6B022909-DD03-DDEC-ED3D-CF4922720042}"/>
+              </a:ext>
+            </a:extLst>
+          </p:cNvPr>
+          <p:cNvSpPr txBox="1"/>
+          <p:nvPr/>
+        </p:nvSpPr>
+        <p:spPr>
+          <a:xfrm>
+            <a:off x="550506" y="149290"/>
+            <a:ext cx="2584580" cy="646331"/>
+          </a:xfrm>
+          <a:prstGeom prst="rect">
+            <a:avLst/>
+          </a:prstGeom>
+          <a:noFill/>
+        </p:spPr>
+        <p:txBody>
+          <a:bodyPr wrap="square" rtlCol="0">
+            <a:spAutoFit/>
+          </a:bodyPr>
+          <a:lstStyle/>
+          <a:p>
+            <a:r>
+              <a:rPr lang="en-US" dirty="0"/>
+              <a:t>W: 8315, 8458?, 9070, 9105, 9140, 10419? eV</a:t>
+            </a:r>
+          </a:p>
+        </p:txBody>
+      </p:sp>
+      <p:sp>
+        <p:nvSpPr>
+          <p:cNvPr id="3" name="TextBox 2">
+            <a:extLst>
+              <a:ext uri="{FF2B5EF4-FFF2-40B4-BE49-F238E27FC236}">
+                <a16:creationId xmlns:a16="http://schemas.microsoft.com/office/drawing/2014/main" id="{BB8C2B2B-8966-0D8A-EF01-BFFD7E84C1D4}"/>
+              </a:ext>
+            </a:extLst>
+          </p:cNvPr>
+          <p:cNvSpPr txBox="1"/>
+          <p:nvPr/>
+        </p:nvSpPr>
+        <p:spPr>
+          <a:xfrm>
+            <a:off x="3716694" y="149290"/>
+            <a:ext cx="2584580" cy="369332"/>
+          </a:xfrm>
+          <a:prstGeom prst="rect">
+            <a:avLst/>
+          </a:prstGeom>
+          <a:noFill/>
+        </p:spPr>
+        <p:txBody>
+          <a:bodyPr wrap="square" rtlCol="0">
+            <a:spAutoFit/>
+          </a:bodyPr>
+          <a:lstStyle/>
+          <a:p>
+            <a:r>
+              <a:rPr lang="en-US" dirty="0"/>
+              <a:t>Re: 8554, 9381, 9413 eV</a:t>
+            </a:r>
+          </a:p>
+        </p:txBody>
+      </p:sp>
+      <p:sp>
+        <p:nvSpPr>
+          <p:cNvPr id="4" name="TextBox 3">
+            <a:extLst>
+              <a:ext uri="{FF2B5EF4-FFF2-40B4-BE49-F238E27FC236}">
+                <a16:creationId xmlns:a16="http://schemas.microsoft.com/office/drawing/2014/main" id="{5D5F3E49-61E7-E335-DE4C-BE1CF653DCAD}"/>
+              </a:ext>
+            </a:extLst>
+          </p:cNvPr>
+          <p:cNvSpPr txBox="1"/>
+          <p:nvPr/>
+        </p:nvSpPr>
+        <p:spPr>
+          <a:xfrm>
+            <a:off x="6640286" y="147830"/>
+            <a:ext cx="2584580" cy="369332"/>
+          </a:xfrm>
+          <a:prstGeom prst="rect">
+            <a:avLst/>
+          </a:prstGeom>
+          <a:noFill/>
+        </p:spPr>
+        <p:txBody>
+          <a:bodyPr wrap="square" rtlCol="0">
+            <a:spAutoFit/>
+          </a:bodyPr>
+          <a:lstStyle/>
+          <a:p>
+            <a:r>
+              <a:rPr lang="en-US" dirty="0" err="1"/>
+              <a:t>Os</a:t>
+            </a:r>
+            <a:r>
+              <a:rPr lang="en-US" dirty="0"/>
+              <a:t>: 10530 eV</a:t>
+            </a:r>
+          </a:p>
+        </p:txBody>
+      </p:sp>
+    </p:spTree>
+    <p:extLst>
+      <p:ext uri="{BB962C8B-B14F-4D97-AF65-F5344CB8AC3E}">
+        <p14:creationId xmlns:p14="http://schemas.microsoft.com/office/powerpoint/2010/main" val="2764729115"/>
+      </p:ext>
+    </p:extLst>
+  </p:cSld>
+  <p:clrMapOvr>
+    <a:masterClrMapping/>
+  </p:clrMapOvr>
+</p:sld>
+</file>
+
 <file path=ppt/theme/theme1.xml><?xml version="1.0" encoding="utf-8"?>
 <a:theme xmlns:a="http://schemas.openxmlformats.org/drawingml/2006/main" name="Office Theme">
   <a:themeElements>

</xml_diff>